<commit_message>
Added results slide comparing graphs and showing results of test.
</commit_message>
<xml_diff>
--- a/PresentationSlides.pptx
+++ b/PresentationSlides.pptx
@@ -17,8 +17,9 @@
     <p:sldId id="260" r:id="rId11"/>
     <p:sldId id="261" r:id="rId12"/>
     <p:sldId id="269" r:id="rId13"/>
-    <p:sldId id="257" r:id="rId14"/>
-    <p:sldId id="259" r:id="rId15"/>
+    <p:sldId id="270" r:id="rId14"/>
+    <p:sldId id="257" r:id="rId15"/>
+    <p:sldId id="259" r:id="rId16"/>
   </p:sldIdLst>
   <p:sldSz cx="12192000" cy="6858000"/>
   <p:notesSz cx="6858000" cy="9144000"/>
@@ -321,7 +322,7 @@
             <a:fld id="{B61BEF0D-F0BB-DE4B-95CE-6DB70DBA9567}" type="datetimeFigureOut">
               <a:rPr lang="en-US" dirty="0"/>
               <a:pPr/>
-              <a:t>5/2/2018</a:t>
+              <a:t>5/3/2018</a:t>
             </a:fld>
             <a:endParaRPr lang="en-US" dirty="0"/>
           </a:p>
@@ -754,7 +755,7 @@
             <a:fld id="{B61BEF0D-F0BB-DE4B-95CE-6DB70DBA9567}" type="datetimeFigureOut">
               <a:rPr lang="en-US" dirty="0"/>
               <a:pPr/>
-              <a:t>5/2/2018</a:t>
+              <a:t>5/3/2018</a:t>
             </a:fld>
             <a:endParaRPr lang="en-US" dirty="0"/>
           </a:p>
@@ -1001,7 +1002,7 @@
             <a:fld id="{B61BEF0D-F0BB-DE4B-95CE-6DB70DBA9567}" type="datetimeFigureOut">
               <a:rPr lang="en-US" dirty="0"/>
               <a:pPr/>
-              <a:t>5/2/2018</a:t>
+              <a:t>5/3/2018</a:t>
             </a:fld>
             <a:endParaRPr lang="en-US" dirty="0"/>
           </a:p>
@@ -1306,7 +1307,7 @@
             <a:fld id="{B61BEF0D-F0BB-DE4B-95CE-6DB70DBA9567}" type="datetimeFigureOut">
               <a:rPr lang="en-US" dirty="0"/>
               <a:pPr/>
-              <a:t>5/2/2018</a:t>
+              <a:t>5/3/2018</a:t>
             </a:fld>
             <a:endParaRPr lang="en-US" dirty="0"/>
           </a:p>
@@ -1621,7 +1622,7 @@
             <a:fld id="{B61BEF0D-F0BB-DE4B-95CE-6DB70DBA9567}" type="datetimeFigureOut">
               <a:rPr lang="en-US" dirty="0"/>
               <a:pPr/>
-              <a:t>5/2/2018</a:t>
+              <a:t>5/3/2018</a:t>
             </a:fld>
             <a:endParaRPr lang="en-US" dirty="0"/>
           </a:p>
@@ -1920,7 +1921,7 @@
             <a:fld id="{B61BEF0D-F0BB-DE4B-95CE-6DB70DBA9567}" type="datetimeFigureOut">
               <a:rPr lang="en-US" dirty="0"/>
               <a:pPr/>
-              <a:t>5/2/2018</a:t>
+              <a:t>5/3/2018</a:t>
             </a:fld>
             <a:endParaRPr lang="en-US" dirty="0"/>
           </a:p>
@@ -2284,7 +2285,7 @@
             <a:fld id="{B61BEF0D-F0BB-DE4B-95CE-6DB70DBA9567}" type="datetimeFigureOut">
               <a:rPr lang="en-US" dirty="0"/>
               <a:pPr/>
-              <a:t>5/2/2018</a:t>
+              <a:t>5/3/2018</a:t>
             </a:fld>
             <a:endParaRPr lang="en-US" dirty="0"/>
           </a:p>
@@ -2455,7 +2456,7 @@
             <a:fld id="{B61BEF0D-F0BB-DE4B-95CE-6DB70DBA9567}" type="datetimeFigureOut">
               <a:rPr lang="en-US" dirty="0"/>
               <a:pPr/>
-              <a:t>5/2/2018</a:t>
+              <a:t>5/3/2018</a:t>
             </a:fld>
             <a:endParaRPr lang="en-US" dirty="0"/>
           </a:p>
@@ -2632,7 +2633,7 @@
             <a:fld id="{B61BEF0D-F0BB-DE4B-95CE-6DB70DBA9567}" type="datetimeFigureOut">
               <a:rPr lang="en-US" dirty="0"/>
               <a:pPr/>
-              <a:t>5/2/2018</a:t>
+              <a:t>5/3/2018</a:t>
             </a:fld>
             <a:endParaRPr lang="en-US" dirty="0"/>
           </a:p>
@@ -2799,7 +2800,7 @@
             <a:fld id="{B61BEF0D-F0BB-DE4B-95CE-6DB70DBA9567}" type="datetimeFigureOut">
               <a:rPr lang="en-US" dirty="0"/>
               <a:pPr/>
-              <a:t>5/2/2018</a:t>
+              <a:t>5/3/2018</a:t>
             </a:fld>
             <a:endParaRPr lang="en-US" dirty="0"/>
           </a:p>
@@ -3046,7 +3047,7 @@
             <a:fld id="{B61BEF0D-F0BB-DE4B-95CE-6DB70DBA9567}" type="datetimeFigureOut">
               <a:rPr lang="en-US" dirty="0"/>
               <a:pPr/>
-              <a:t>5/2/2018</a:t>
+              <a:t>5/3/2018</a:t>
             </a:fld>
             <a:endParaRPr lang="en-US" dirty="0"/>
           </a:p>
@@ -3279,7 +3280,7 @@
             <a:fld id="{B61BEF0D-F0BB-DE4B-95CE-6DB70DBA9567}" type="datetimeFigureOut">
               <a:rPr lang="en-US" dirty="0"/>
               <a:pPr/>
-              <a:t>5/2/2018</a:t>
+              <a:t>5/3/2018</a:t>
             </a:fld>
             <a:endParaRPr lang="en-US" dirty="0"/>
           </a:p>
@@ -3658,7 +3659,7 @@
             <a:fld id="{B61BEF0D-F0BB-DE4B-95CE-6DB70DBA9567}" type="datetimeFigureOut">
               <a:rPr lang="en-US" dirty="0"/>
               <a:pPr/>
-              <a:t>5/2/2018</a:t>
+              <a:t>5/3/2018</a:t>
             </a:fld>
             <a:endParaRPr lang="en-US" dirty="0"/>
           </a:p>
@@ -3773,7 +3774,7 @@
             <a:fld id="{B61BEF0D-F0BB-DE4B-95CE-6DB70DBA9567}" type="datetimeFigureOut">
               <a:rPr lang="en-US" dirty="0"/>
               <a:pPr/>
-              <a:t>5/2/2018</a:t>
+              <a:t>5/3/2018</a:t>
             </a:fld>
             <a:endParaRPr lang="en-US" dirty="0"/>
           </a:p>
@@ -3865,7 +3866,7 @@
             <a:fld id="{B61BEF0D-F0BB-DE4B-95CE-6DB70DBA9567}" type="datetimeFigureOut">
               <a:rPr lang="en-US" dirty="0"/>
               <a:pPr/>
-              <a:t>5/2/2018</a:t>
+              <a:t>5/3/2018</a:t>
             </a:fld>
             <a:endParaRPr lang="en-US" dirty="0"/>
           </a:p>
@@ -4117,7 +4118,7 @@
             <a:fld id="{B61BEF0D-F0BB-DE4B-95CE-6DB70DBA9567}" type="datetimeFigureOut">
               <a:rPr lang="en-US" dirty="0"/>
               <a:pPr/>
-              <a:t>5/2/2018</a:t>
+              <a:t>5/3/2018</a:t>
             </a:fld>
             <a:endParaRPr lang="en-US" dirty="0"/>
           </a:p>
@@ -4397,7 +4398,7 @@
             <a:fld id="{B61BEF0D-F0BB-DE4B-95CE-6DB70DBA9567}" type="datetimeFigureOut">
               <a:rPr lang="en-US" dirty="0"/>
               <a:pPr/>
-              <a:t>5/2/2018</a:t>
+              <a:t>5/3/2018</a:t>
             </a:fld>
             <a:endParaRPr lang="en-US" dirty="0"/>
           </a:p>
@@ -4800,7 +4801,7 @@
             <a:fld id="{B61BEF0D-F0BB-DE4B-95CE-6DB70DBA9567}" type="datetimeFigureOut">
               <a:rPr lang="en-US" dirty="0"/>
               <a:pPr/>
-              <a:t>5/2/2018</a:t>
+              <a:t>5/3/2018</a:t>
             </a:fld>
             <a:endParaRPr lang="en-US" dirty="0"/>
           </a:p>
@@ -5773,6 +5774,209 @@
       </p:grpSpPr>
       <p:sp>
         <p:nvSpPr>
+          <p:cNvPr id="2" name="Title 1">
+            <a:extLst>
+              <a:ext uri="{FF2B5EF4-FFF2-40B4-BE49-F238E27FC236}">
+                <a16:creationId xmlns:a16="http://schemas.microsoft.com/office/drawing/2014/main" id="{9F262769-C3E2-4581-BBE6-EA2204040F1B}"/>
+              </a:ext>
+            </a:extLst>
+          </p:cNvPr>
+          <p:cNvSpPr>
+            <a:spLocks noGrp="1"/>
+          </p:cNvSpPr>
+          <p:nvPr>
+            <p:ph type="title"/>
+          </p:nvPr>
+        </p:nvSpPr>
+        <p:spPr/>
+        <p:txBody>
+          <a:bodyPr/>
+          <a:lstStyle/>
+          <a:p>
+            <a:r>
+              <a:rPr lang="en-US" dirty="0" err="1"/>
+              <a:t>ResultS</a:t>
+            </a:r>
+            <a:endParaRPr lang="en-US" dirty="0"/>
+          </a:p>
+        </p:txBody>
+      </p:sp>
+      <p:sp>
+        <p:nvSpPr>
+          <p:cNvPr id="14" name="Text Placeholder 13">
+            <a:extLst>
+              <a:ext uri="{FF2B5EF4-FFF2-40B4-BE49-F238E27FC236}">
+                <a16:creationId xmlns:a16="http://schemas.microsoft.com/office/drawing/2014/main" id="{EC4E70E6-A654-4D67-B1CC-3549A9F04AFF}"/>
+              </a:ext>
+            </a:extLst>
+          </p:cNvPr>
+          <p:cNvSpPr>
+            <a:spLocks noGrp="1"/>
+          </p:cNvSpPr>
+          <p:nvPr>
+            <p:ph type="body" idx="1"/>
+          </p:nvPr>
+        </p:nvSpPr>
+        <p:spPr/>
+        <p:txBody>
+          <a:bodyPr/>
+          <a:lstStyle/>
+          <a:p>
+            <a:r>
+              <a:rPr lang="en-US" dirty="0"/>
+              <a:t>Feed-forward</a:t>
+            </a:r>
+          </a:p>
+        </p:txBody>
+      </p:sp>
+      <p:pic>
+        <p:nvPicPr>
+          <p:cNvPr id="19" name="Content Placeholder 18">
+            <a:extLst>
+              <a:ext uri="{FF2B5EF4-FFF2-40B4-BE49-F238E27FC236}">
+                <a16:creationId xmlns:a16="http://schemas.microsoft.com/office/drawing/2014/main" id="{4B32A562-C3F7-41D4-8936-315654F0942A}"/>
+              </a:ext>
+            </a:extLst>
+          </p:cNvPr>
+          <p:cNvPicPr>
+            <a:picLocks noGrp="1" noChangeAspect="1"/>
+          </p:cNvPicPr>
+          <p:nvPr>
+            <p:ph sz="half" idx="2"/>
+          </p:nvPr>
+        </p:nvPicPr>
+        <p:blipFill>
+          <a:blip r:embed="rId2"/>
+          <a:stretch>
+            <a:fillRect/>
+          </a:stretch>
+        </p:blipFill>
+        <p:spPr>
+          <a:xfrm>
+            <a:off x="1043251" y="1461459"/>
+            <a:ext cx="4219048" cy="2647619"/>
+          </a:xfrm>
+        </p:spPr>
+      </p:pic>
+      <p:sp>
+        <p:nvSpPr>
+          <p:cNvPr id="16" name="Text Placeholder 15">
+            <a:extLst>
+              <a:ext uri="{FF2B5EF4-FFF2-40B4-BE49-F238E27FC236}">
+                <a16:creationId xmlns:a16="http://schemas.microsoft.com/office/drawing/2014/main" id="{BBEFB9FF-59C7-4827-883B-D529CC5FF422}"/>
+              </a:ext>
+            </a:extLst>
+          </p:cNvPr>
+          <p:cNvSpPr>
+            <a:spLocks noGrp="1"/>
+          </p:cNvSpPr>
+          <p:nvPr>
+            <p:ph type="body" sz="quarter" idx="3"/>
+          </p:nvPr>
+        </p:nvSpPr>
+        <p:spPr/>
+        <p:txBody>
+          <a:bodyPr/>
+          <a:lstStyle/>
+          <a:p>
+            <a:r>
+              <a:rPr lang="en-US" dirty="0"/>
+              <a:t>Convolutional</a:t>
+            </a:r>
+          </a:p>
+        </p:txBody>
+      </p:sp>
+      <p:pic>
+        <p:nvPicPr>
+          <p:cNvPr id="21" name="Content Placeholder 20">
+            <a:extLst>
+              <a:ext uri="{FF2B5EF4-FFF2-40B4-BE49-F238E27FC236}">
+                <a16:creationId xmlns:a16="http://schemas.microsoft.com/office/drawing/2014/main" id="{744A3C62-A665-4DE2-9648-87633B0FCAB0}"/>
+              </a:ext>
+            </a:extLst>
+          </p:cNvPr>
+          <p:cNvPicPr>
+            <a:picLocks noGrp="1" noChangeAspect="1"/>
+          </p:cNvPicPr>
+          <p:nvPr>
+            <p:ph sz="quarter" idx="4"/>
+          </p:nvPr>
+        </p:nvPicPr>
+        <p:blipFill>
+          <a:blip r:embed="rId3"/>
+          <a:stretch>
+            <a:fillRect/>
+          </a:stretch>
+        </p:blipFill>
+        <p:spPr>
+          <a:xfrm>
+            <a:off x="5807075" y="1324928"/>
+            <a:ext cx="4929188" cy="2904807"/>
+          </a:xfrm>
+        </p:spPr>
+      </p:pic>
+      <p:pic>
+        <p:nvPicPr>
+          <p:cNvPr id="23" name="Picture 22">
+            <a:extLst>
+              <a:ext uri="{FF2B5EF4-FFF2-40B4-BE49-F238E27FC236}">
+                <a16:creationId xmlns:a16="http://schemas.microsoft.com/office/drawing/2014/main" id="{E37B0B54-F923-4F4A-9A57-D0582ADE794A}"/>
+              </a:ext>
+            </a:extLst>
+          </p:cNvPr>
+          <p:cNvPicPr>
+            <a:picLocks noChangeAspect="1"/>
+          </p:cNvPicPr>
+          <p:nvPr/>
+        </p:nvPicPr>
+        <p:blipFill>
+          <a:blip r:embed="rId4"/>
+          <a:stretch>
+            <a:fillRect/>
+          </a:stretch>
+        </p:blipFill>
+        <p:spPr>
+          <a:xfrm>
+            <a:off x="3389295" y="4607989"/>
+            <a:ext cx="4686243" cy="584121"/>
+          </a:xfrm>
+          <a:prstGeom prst="rect">
+            <a:avLst/>
+          </a:prstGeom>
+        </p:spPr>
+      </p:pic>
+    </p:spTree>
+    <p:extLst>
+      <p:ext uri="{BB962C8B-B14F-4D97-AF65-F5344CB8AC3E}">
+        <p14:creationId xmlns:p14="http://schemas.microsoft.com/office/powerpoint/2010/main" val="2321022352"/>
+      </p:ext>
+    </p:extLst>
+  </p:cSld>
+  <p:clrMapOvr>
+    <a:masterClrMapping/>
+  </p:clrMapOvr>
+</p:sld>
+</file>
+
+<file path=ppt/slides/slide14.xml><?xml version="1.0" encoding="utf-8"?>
+<p:sld xmlns:a="http://schemas.openxmlformats.org/drawingml/2006/main" xmlns:r="http://schemas.openxmlformats.org/officeDocument/2006/relationships" xmlns:p="http://schemas.openxmlformats.org/presentationml/2006/main">
+  <p:cSld>
+    <p:spTree>
+      <p:nvGrpSpPr>
+        <p:cNvPr id="1" name=""/>
+        <p:cNvGrpSpPr/>
+        <p:nvPr/>
+      </p:nvGrpSpPr>
+      <p:grpSpPr>
+        <a:xfrm>
+          <a:off x="0" y="0"/>
+          <a:ext cx="0" cy="0"/>
+          <a:chOff x="0" y="0"/>
+          <a:chExt cx="0" cy="0"/>
+        </a:xfrm>
+      </p:grpSpPr>
+      <p:sp>
+        <p:nvSpPr>
           <p:cNvPr id="4" name="Title 3">
             <a:extLst>
               <a:ext uri="{FF2B5EF4-FFF2-40B4-BE49-F238E27FC236}">
@@ -5837,7 +6041,7 @@
 </p:sld>
 </file>
 
-<file path=ppt/slides/slide14.xml><?xml version="1.0" encoding="utf-8"?>
+<file path=ppt/slides/slide15.xml><?xml version="1.0" encoding="utf-8"?>
 <p:sld xmlns:a="http://schemas.openxmlformats.org/drawingml/2006/main" xmlns:r="http://schemas.openxmlformats.org/officeDocument/2006/relationships" xmlns:p="http://schemas.openxmlformats.org/presentationml/2006/main">
   <p:cSld>
     <p:spTree>
@@ -6009,7 +6213,7 @@
           <a:p>
             <a:r>
               <a:rPr lang="en-US" dirty="0"/>
-              <a:t>We wanted to make a simple driver that would allow a human user to play a simple 5-card draw game against the superior neural network.</a:t>
+              <a:t>We wanted to make a driver that would allow a human user to play a simple 5-card draw game against the superior neural network.</a:t>
             </a:r>
           </a:p>
           <a:p>
@@ -7391,13 +7595,13 @@
   <p:clrMapOvr>
     <a:masterClrMapping/>
   </p:clrMapOvr>
-  <mc:AlternateContent xmlns:mc="http://schemas.openxmlformats.org/markup-compatibility/2006">
-    <mc:Choice xmlns:p14="http://schemas.microsoft.com/office/powerpoint/2010/main" Requires="p14">
+  <mc:AlternateContent xmlns:mc="http://schemas.openxmlformats.org/markup-compatibility/2006" xmlns:p14="http://schemas.microsoft.com/office/powerpoint/2010/main">
+    <mc:Choice Requires="p14">
       <p:transition spd="med" p14:dur="700">
         <p:fade/>
       </p:transition>
     </mc:Choice>
-    <mc:Fallback>
+    <mc:Fallback xmlns="">
       <p:transition spd="med">
         <p:fade/>
       </p:transition>
@@ -7621,13 +7825,13 @@
   <p:clrMapOvr>
     <a:masterClrMapping/>
   </p:clrMapOvr>
-  <mc:AlternateContent xmlns:mc="http://schemas.openxmlformats.org/markup-compatibility/2006">
-    <mc:Choice xmlns:p14="http://schemas.microsoft.com/office/powerpoint/2010/main" Requires="p14">
+  <mc:AlternateContent xmlns:mc="http://schemas.openxmlformats.org/markup-compatibility/2006" xmlns:p14="http://schemas.microsoft.com/office/powerpoint/2010/main">
+    <mc:Choice Requires="p14">
       <p:transition spd="med" p14:dur="700">
         <p:fade/>
       </p:transition>
     </mc:Choice>
-    <mc:Fallback>
+    <mc:Fallback xmlns="">
       <p:transition spd="med">
         <p:fade/>
       </p:transition>

</xml_diff>